<commit_message>
typos detected during the Feb2022 course
</commit_message>
<xml_diff>
--- a/assets/pptx/First-steps-with-R_practicals_day1.pptx
+++ b/assets/pptx/First-steps-with-R_practicals_day1.pptx
@@ -235,7 +235,7 @@
           <a:bodyPr lIns="0" rIns="0" tIns="0" bIns="0" anchor="b"/>
           <a:p>
             <a:pPr algn="r"/>
-            <a:fld id="{02449E4C-7E74-4E33-9D4B-ADE525A9191C}" type="slidenum">
+            <a:fld id="{A684E116-171E-4756-BD7D-BAE9E4C01941}" type="slidenum">
               <a:rPr b="0" lang="en-US" sz="1400" spc="-1" strike="noStrike">
                 <a:latin typeface="Times New Roman"/>
               </a:rPr>
@@ -283,7 +283,7 @@
         <p:spPr>
           <a:xfrm>
             <a:off x="1143000" y="685800"/>
-            <a:ext cx="4566960" cy="3423960"/>
+            <a:ext cx="4566600" cy="3423600"/>
           </a:xfrm>
           <a:prstGeom prst="rect">
             <a:avLst/>
@@ -303,7 +303,7 @@
         <p:spPr>
           <a:xfrm>
             <a:off x="685800" y="4343400"/>
-            <a:ext cx="5481000" cy="4109400"/>
+            <a:ext cx="5480640" cy="4109040"/>
           </a:xfrm>
           <a:prstGeom prst="rect">
             <a:avLst/>
@@ -327,7 +327,7 @@
         <p:spPr>
           <a:xfrm>
             <a:off x="3884760" y="8685360"/>
-            <a:ext cx="2966400" cy="451800"/>
+            <a:ext cx="2966040" cy="451440"/>
           </a:xfrm>
           <a:prstGeom prst="rect">
             <a:avLst/>
@@ -379,7 +379,7 @@
         <p:spPr>
           <a:xfrm>
             <a:off x="1143000" y="685800"/>
-            <a:ext cx="4566960" cy="3423960"/>
+            <a:ext cx="4566600" cy="3423600"/>
           </a:xfrm>
           <a:prstGeom prst="rect">
             <a:avLst/>
@@ -399,7 +399,7 @@
         <p:spPr>
           <a:xfrm>
             <a:off x="685800" y="4343400"/>
-            <a:ext cx="5481000" cy="4109400"/>
+            <a:ext cx="5480640" cy="4109040"/>
           </a:xfrm>
           <a:prstGeom prst="rect">
             <a:avLst/>
@@ -408,7 +408,7 @@
         <p:txBody>
           <a:bodyPr lIns="0" rIns="0" tIns="0" bIns="0"/>
           <a:p>
-            <a:pPr marL="216000" indent="-214560">
+            <a:pPr marL="216000" indent="-214200">
               <a:lnSpc>
                 <a:spcPct val="100000"/>
               </a:lnSpc>
@@ -424,7 +424,7 @@
             </a:endParaRPr>
           </a:p>
           <a:p>
-            <a:pPr marL="216000" indent="-214560">
+            <a:pPr marL="216000" indent="-214200">
               <a:lnSpc>
                 <a:spcPct val="100000"/>
               </a:lnSpc>
@@ -440,7 +440,7 @@
             </a:endParaRPr>
           </a:p>
           <a:p>
-            <a:pPr marL="216000" indent="-214560">
+            <a:pPr marL="216000" indent="-214200">
               <a:lnSpc>
                 <a:spcPct val="100000"/>
               </a:lnSpc>
@@ -466,7 +466,7 @@
         <p:spPr>
           <a:xfrm>
             <a:off x="3884760" y="8685360"/>
-            <a:ext cx="2966400" cy="451800"/>
+            <a:ext cx="2966040" cy="451440"/>
           </a:xfrm>
           <a:prstGeom prst="rect">
             <a:avLst/>
@@ -518,7 +518,7 @@
         <p:spPr>
           <a:xfrm>
             <a:off x="1143000" y="685800"/>
-            <a:ext cx="4566960" cy="3423960"/>
+            <a:ext cx="4566600" cy="3423600"/>
           </a:xfrm>
           <a:prstGeom prst="rect">
             <a:avLst/>
@@ -538,7 +538,7 @@
         <p:spPr>
           <a:xfrm>
             <a:off x="685800" y="4343400"/>
-            <a:ext cx="5481000" cy="4109400"/>
+            <a:ext cx="5480640" cy="4109040"/>
           </a:xfrm>
           <a:prstGeom prst="rect">
             <a:avLst/>
@@ -547,7 +547,7 @@
         <p:txBody>
           <a:bodyPr lIns="0" rIns="0" tIns="0" bIns="0"/>
           <a:p>
-            <a:pPr marL="216000" indent="-210960">
+            <a:pPr marL="216000" indent="-210600">
               <a:lnSpc>
                 <a:spcPct val="100000"/>
               </a:lnSpc>
@@ -573,7 +573,7 @@
         <p:spPr>
           <a:xfrm>
             <a:off x="3884760" y="8685360"/>
-            <a:ext cx="2966400" cy="451800"/>
+            <a:ext cx="2966040" cy="451440"/>
           </a:xfrm>
           <a:prstGeom prst="rect">
             <a:avLst/>
@@ -625,7 +625,7 @@
         <p:spPr>
           <a:xfrm>
             <a:off x="1143000" y="685800"/>
-            <a:ext cx="4566960" cy="3423960"/>
+            <a:ext cx="4566600" cy="3423600"/>
           </a:xfrm>
           <a:prstGeom prst="rect">
             <a:avLst/>
@@ -645,7 +645,7 @@
         <p:spPr>
           <a:xfrm>
             <a:off x="685800" y="4343400"/>
-            <a:ext cx="5481000" cy="4109400"/>
+            <a:ext cx="5480640" cy="4109040"/>
           </a:xfrm>
           <a:prstGeom prst="rect">
             <a:avLst/>
@@ -654,7 +654,7 @@
         <p:txBody>
           <a:bodyPr lIns="0" rIns="0" tIns="0" bIns="0"/>
           <a:p>
-            <a:pPr marL="216000" indent="-210960">
+            <a:pPr marL="216000" indent="-210600">
               <a:lnSpc>
                 <a:spcPct val="100000"/>
               </a:lnSpc>
@@ -680,7 +680,7 @@
         <p:spPr>
           <a:xfrm>
             <a:off x="3884760" y="8685360"/>
-            <a:ext cx="2966400" cy="451800"/>
+            <a:ext cx="2966040" cy="451440"/>
           </a:xfrm>
           <a:prstGeom prst="rect">
             <a:avLst/>
@@ -732,7 +732,7 @@
         <p:spPr>
           <a:xfrm>
             <a:off x="1143000" y="685800"/>
-            <a:ext cx="4566960" cy="3423960"/>
+            <a:ext cx="4566600" cy="3423600"/>
           </a:xfrm>
           <a:prstGeom prst="rect">
             <a:avLst/>
@@ -752,7 +752,7 @@
         <p:spPr>
           <a:xfrm>
             <a:off x="685800" y="4343400"/>
-            <a:ext cx="5481000" cy="4109400"/>
+            <a:ext cx="5480640" cy="4109040"/>
           </a:xfrm>
           <a:prstGeom prst="rect">
             <a:avLst/>
@@ -761,7 +761,7 @@
         <p:txBody>
           <a:bodyPr lIns="0" rIns="0" tIns="0" bIns="0"/>
           <a:p>
-            <a:pPr marL="216000" indent="-210960">
+            <a:pPr marL="216000" indent="-210600">
               <a:lnSpc>
                 <a:spcPct val="100000"/>
               </a:lnSpc>
@@ -787,7 +787,7 @@
         <p:spPr>
           <a:xfrm>
             <a:off x="3884760" y="8685360"/>
-            <a:ext cx="2966400" cy="451800"/>
+            <a:ext cx="2966040" cy="451440"/>
           </a:xfrm>
           <a:prstGeom prst="rect">
             <a:avLst/>
@@ -839,7 +839,7 @@
         <p:spPr>
           <a:xfrm>
             <a:off x="1143000" y="685800"/>
-            <a:ext cx="4566960" cy="3423960"/>
+            <a:ext cx="4566600" cy="3423600"/>
           </a:xfrm>
           <a:prstGeom prst="rect">
             <a:avLst/>
@@ -859,7 +859,7 @@
         <p:spPr>
           <a:xfrm>
             <a:off x="685800" y="4343400"/>
-            <a:ext cx="5481000" cy="4109400"/>
+            <a:ext cx="5480640" cy="4109040"/>
           </a:xfrm>
           <a:prstGeom prst="rect">
             <a:avLst/>
@@ -868,7 +868,7 @@
         <p:txBody>
           <a:bodyPr lIns="0" rIns="0" tIns="0" bIns="0"/>
           <a:p>
-            <a:pPr marL="216000" indent="-210960">
+            <a:pPr marL="216000" indent="-210600">
               <a:lnSpc>
                 <a:spcPct val="100000"/>
               </a:lnSpc>
@@ -894,7 +894,7 @@
         <p:spPr>
           <a:xfrm>
             <a:off x="3884760" y="8685360"/>
-            <a:ext cx="2966400" cy="451800"/>
+            <a:ext cx="2966040" cy="451440"/>
           </a:xfrm>
           <a:prstGeom prst="rect">
             <a:avLst/>
@@ -946,7 +946,7 @@
         <p:spPr>
           <a:xfrm>
             <a:off x="1143000" y="685800"/>
-            <a:ext cx="4566960" cy="3423960"/>
+            <a:ext cx="4566600" cy="3423600"/>
           </a:xfrm>
           <a:prstGeom prst="rect">
             <a:avLst/>
@@ -966,7 +966,7 @@
         <p:spPr>
           <a:xfrm>
             <a:off x="685800" y="4343400"/>
-            <a:ext cx="5481000" cy="4109400"/>
+            <a:ext cx="5480640" cy="4109040"/>
           </a:xfrm>
           <a:prstGeom prst="rect">
             <a:avLst/>
@@ -975,7 +975,7 @@
         <p:txBody>
           <a:bodyPr lIns="0" rIns="0" tIns="0" bIns="0"/>
           <a:p>
-            <a:pPr marL="216000" indent="-210960">
+            <a:pPr marL="216000" indent="-210600">
               <a:lnSpc>
                 <a:spcPct val="100000"/>
               </a:lnSpc>
@@ -1001,7 +1001,7 @@
         <p:spPr>
           <a:xfrm>
             <a:off x="3884760" y="8685360"/>
-            <a:ext cx="2966400" cy="451800"/>
+            <a:ext cx="2966040" cy="451440"/>
           </a:xfrm>
           <a:prstGeom prst="rect">
             <a:avLst/>
@@ -5052,7 +5052,7 @@
         <p:spPr>
           <a:xfrm>
             <a:off x="8371800" y="6725520"/>
-            <a:ext cx="642240" cy="116640"/>
+            <a:ext cx="641880" cy="116280"/>
           </a:xfrm>
           <a:prstGeom prst="rect">
             <a:avLst/>
@@ -5336,7 +5336,7 @@
         <p:spPr>
           <a:xfrm>
             <a:off x="8371800" y="6725520"/>
-            <a:ext cx="642240" cy="116640"/>
+            <a:ext cx="641880" cy="116280"/>
           </a:xfrm>
           <a:prstGeom prst="rect">
             <a:avLst/>
@@ -5620,7 +5620,7 @@
         <p:spPr>
           <a:xfrm>
             <a:off x="8371800" y="6725520"/>
-            <a:ext cx="642240" cy="116640"/>
+            <a:ext cx="641880" cy="116280"/>
           </a:xfrm>
           <a:prstGeom prst="rect">
             <a:avLst/>
@@ -5897,7 +5897,7 @@
         <p:spPr>
           <a:xfrm>
             <a:off x="258480" y="216720"/>
-            <a:ext cx="8634960" cy="6376680"/>
+            <a:ext cx="8634600" cy="6376320"/>
           </a:xfrm>
           <a:prstGeom prst="rect">
             <a:avLst/>
@@ -5923,7 +5923,7 @@
         <p:spPr>
           <a:xfrm>
             <a:off x="393480" y="938160"/>
-            <a:ext cx="8468640" cy="5562360"/>
+            <a:ext cx="8468280" cy="5562000"/>
           </a:xfrm>
           <a:prstGeom prst="rect">
             <a:avLst/>
@@ -5942,7 +5942,7 @@
         <p:txBody>
           <a:bodyPr lIns="0" rIns="0" tIns="0" bIns="0"/>
           <a:p>
-            <a:pPr marL="266760" indent="-261360">
+            <a:pPr marL="266760" indent="-261000">
               <a:lnSpc>
                 <a:spcPct val="100000"/>
               </a:lnSpc>
@@ -5970,7 +5970,7 @@
             </a:endParaRPr>
           </a:p>
           <a:p>
-            <a:pPr marL="266760" indent="-261360">
+            <a:pPr marL="266760" indent="-261000">
               <a:lnSpc>
                 <a:spcPct val="100000"/>
               </a:lnSpc>
@@ -6018,7 +6018,7 @@
             </a:endParaRPr>
           </a:p>
           <a:p>
-            <a:pPr marL="457200" indent="-455400">
+            <a:pPr marL="457200" indent="-455040">
               <a:lnSpc>
                 <a:spcPct val="100000"/>
               </a:lnSpc>
@@ -6069,7 +6069,7 @@
         <p:spPr>
           <a:xfrm>
             <a:off x="258480" y="216720"/>
-            <a:ext cx="7937640" cy="604080"/>
+            <a:ext cx="7937280" cy="603720"/>
           </a:xfrm>
           <a:prstGeom prst="rect">
             <a:avLst/>
@@ -6167,7 +6167,7 @@
         <p:spPr>
           <a:xfrm>
             <a:off x="258480" y="216720"/>
-            <a:ext cx="8634960" cy="6376680"/>
+            <a:ext cx="8634600" cy="6376320"/>
           </a:xfrm>
           <a:prstGeom prst="rect">
             <a:avLst/>
@@ -6193,7 +6193,7 @@
         <p:spPr>
           <a:xfrm>
             <a:off x="258480" y="216720"/>
-            <a:ext cx="7937640" cy="604080"/>
+            <a:ext cx="7937280" cy="603720"/>
           </a:xfrm>
           <a:prstGeom prst="rect">
             <a:avLst/>
@@ -6242,7 +6242,7 @@
         <p:spPr>
           <a:xfrm>
             <a:off x="583560" y="4323960"/>
-            <a:ext cx="3373560" cy="2009160"/>
+            <a:ext cx="3373200" cy="2008800"/>
           </a:xfrm>
           <a:prstGeom prst="rect">
             <a:avLst/>
@@ -6401,7 +6401,7 @@
         <p:spPr>
           <a:xfrm>
             <a:off x="365760" y="821880"/>
-            <a:ext cx="8527680" cy="3470040"/>
+            <a:ext cx="8527320" cy="3469680"/>
           </a:xfrm>
           <a:prstGeom prst="rect">
             <a:avLst/>
@@ -6420,7 +6420,7 @@
         <p:txBody>
           <a:bodyPr lIns="90000" rIns="90000" tIns="45000" bIns="45000"/>
           <a:p>
-            <a:pPr marL="216000" indent="-214920">
+            <a:pPr marL="216000" indent="-214560">
               <a:lnSpc>
                 <a:spcPct val="100000"/>
               </a:lnSpc>
@@ -6455,7 +6455,7 @@
             </a:endParaRPr>
           </a:p>
           <a:p>
-            <a:pPr lvl="1" marL="432000" indent="-214920">
+            <a:pPr lvl="1" marL="432000" indent="-214560">
               <a:lnSpc>
                 <a:spcPct val="100000"/>
               </a:lnSpc>
@@ -6481,7 +6481,7 @@
             </a:endParaRPr>
           </a:p>
           <a:p>
-            <a:pPr lvl="1" marL="432000" indent="-214920">
+            <a:pPr lvl="1" marL="432000" indent="-214560">
               <a:lnSpc>
                 <a:spcPct val="100000"/>
               </a:lnSpc>
@@ -6507,7 +6507,7 @@
             </a:endParaRPr>
           </a:p>
           <a:p>
-            <a:pPr lvl="1" marL="432000" indent="-214920">
+            <a:pPr lvl="1" marL="432000" indent="-214560">
               <a:lnSpc>
                 <a:spcPct val="100000"/>
               </a:lnSpc>
@@ -6533,7 +6533,7 @@
             </a:endParaRPr>
           </a:p>
           <a:p>
-            <a:pPr lvl="1" marL="432000" indent="-214920">
+            <a:pPr lvl="1" marL="432000" indent="-214560">
               <a:lnSpc>
                 <a:spcPct val="100000"/>
               </a:lnSpc>
@@ -6559,7 +6559,7 @@
             </a:endParaRPr>
           </a:p>
           <a:p>
-            <a:pPr marL="216000" indent="-214920">
+            <a:pPr marL="216000" indent="-214560">
               <a:lnSpc>
                 <a:spcPct val="100000"/>
               </a:lnSpc>
@@ -6594,7 +6594,7 @@
             </a:endParaRPr>
           </a:p>
           <a:p>
-            <a:pPr lvl="1" marL="432000" indent="-214920">
+            <a:pPr lvl="1" marL="432000" indent="-214560">
               <a:lnSpc>
                 <a:spcPct val="100000"/>
               </a:lnSpc>
@@ -6620,7 +6620,7 @@
             </a:endParaRPr>
           </a:p>
           <a:p>
-            <a:pPr lvl="1" marL="432000" indent="-214920">
+            <a:pPr lvl="1" marL="432000" indent="-214560">
               <a:lnSpc>
                 <a:spcPct val="100000"/>
               </a:lnSpc>
@@ -6646,7 +6646,7 @@
             </a:endParaRPr>
           </a:p>
           <a:p>
-            <a:pPr lvl="1" marL="432000" indent="-214920">
+            <a:pPr lvl="1" marL="432000" indent="-214560">
               <a:lnSpc>
                 <a:spcPct val="100000"/>
               </a:lnSpc>
@@ -6672,7 +6672,7 @@
             </a:endParaRPr>
           </a:p>
           <a:p>
-            <a:pPr lvl="1" marL="432000" indent="-214920">
+            <a:pPr lvl="1" marL="432000" indent="-214560">
               <a:lnSpc>
                 <a:spcPct val="100000"/>
               </a:lnSpc>
@@ -6767,7 +6767,7 @@
         <p:spPr>
           <a:xfrm>
             <a:off x="258480" y="216720"/>
-            <a:ext cx="8634960" cy="6376680"/>
+            <a:ext cx="8634600" cy="6376320"/>
           </a:xfrm>
           <a:prstGeom prst="rect">
             <a:avLst/>
@@ -6793,7 +6793,7 @@
         <p:spPr>
           <a:xfrm>
             <a:off x="191880" y="560160"/>
-            <a:ext cx="7904160" cy="5889240"/>
+            <a:ext cx="7903800" cy="5888880"/>
           </a:xfrm>
           <a:prstGeom prst="rect">
             <a:avLst/>
@@ -6950,7 +6950,7 @@
             </a:endParaRPr>
           </a:p>
           <a:p>
-            <a:pPr marL="266760" indent="-261360">
+            <a:pPr marL="266760" indent="-261000">
               <a:lnSpc>
                 <a:spcPct val="100000"/>
               </a:lnSpc>
@@ -7432,7 +7432,7 @@
         <p:spPr>
           <a:xfrm>
             <a:off x="258480" y="-46800"/>
-            <a:ext cx="7937640" cy="604080"/>
+            <a:ext cx="7937280" cy="603720"/>
           </a:xfrm>
           <a:prstGeom prst="rect">
             <a:avLst/>
@@ -7530,7 +7530,7 @@
         <p:spPr>
           <a:xfrm>
             <a:off x="258480" y="216720"/>
-            <a:ext cx="8634960" cy="6376680"/>
+            <a:ext cx="8634600" cy="6376320"/>
           </a:xfrm>
           <a:prstGeom prst="rect">
             <a:avLst/>
@@ -7556,7 +7556,7 @@
         <p:spPr>
           <a:xfrm>
             <a:off x="191880" y="704160"/>
-            <a:ext cx="8809560" cy="5889240"/>
+            <a:ext cx="8809200" cy="5888880"/>
           </a:xfrm>
           <a:prstGeom prst="rect">
             <a:avLst/>
@@ -8071,7 +8071,7 @@
         <p:spPr>
           <a:xfrm>
             <a:off x="258480" y="-46800"/>
-            <a:ext cx="7937640" cy="604080"/>
+            <a:ext cx="7937280" cy="603720"/>
           </a:xfrm>
           <a:prstGeom prst="rect">
             <a:avLst/>
@@ -8169,7 +8169,7 @@
         <p:spPr>
           <a:xfrm>
             <a:off x="258480" y="216720"/>
-            <a:ext cx="8634960" cy="6376680"/>
+            <a:ext cx="8634600" cy="6376320"/>
           </a:xfrm>
           <a:prstGeom prst="rect">
             <a:avLst/>
@@ -8195,7 +8195,7 @@
         <p:spPr>
           <a:xfrm>
             <a:off x="191880" y="704160"/>
-            <a:ext cx="8853480" cy="6540840"/>
+            <a:ext cx="8853120" cy="6540480"/>
           </a:xfrm>
           <a:prstGeom prst="rect">
             <a:avLst/>
@@ -8227,7 +8227,7 @@
             </a:endParaRPr>
           </a:p>
           <a:p>
-            <a:pPr marL="216000" indent="-215280">
+            <a:pPr marL="216000" indent="-214920">
               <a:lnSpc>
                 <a:spcPct val="100000"/>
               </a:lnSpc>
@@ -8265,7 +8265,7 @@
             </a:endParaRPr>
           </a:p>
           <a:p>
-            <a:pPr marL="216000" indent="-215280">
+            <a:pPr marL="216000" indent="-214920">
               <a:lnSpc>
                 <a:spcPct val="100000"/>
               </a:lnSpc>
@@ -8323,7 +8323,7 @@
             </a:endParaRPr>
           </a:p>
           <a:p>
-            <a:pPr marL="216000" indent="-215280">
+            <a:pPr marL="216000" indent="-214920">
               <a:lnSpc>
                 <a:spcPct val="100000"/>
               </a:lnSpc>
@@ -8351,7 +8351,7 @@
             </a:endParaRPr>
           </a:p>
           <a:p>
-            <a:pPr marL="216000" indent="-215280">
+            <a:pPr marL="216000" indent="-214920">
               <a:lnSpc>
                 <a:spcPct val="100000"/>
               </a:lnSpc>
@@ -8409,7 +8409,7 @@
             </a:endParaRPr>
           </a:p>
           <a:p>
-            <a:pPr marL="216000" indent="-215280">
+            <a:pPr marL="216000" indent="-214920">
               <a:lnSpc>
                 <a:spcPct val="100000"/>
               </a:lnSpc>
@@ -8559,7 +8559,7 @@
         <p:spPr>
           <a:xfrm>
             <a:off x="258480" y="-46800"/>
-            <a:ext cx="7937640" cy="604080"/>
+            <a:ext cx="7937280" cy="603720"/>
           </a:xfrm>
           <a:prstGeom prst="rect">
             <a:avLst/>
@@ -8657,7 +8657,7 @@
         <p:spPr>
           <a:xfrm>
             <a:off x="0" y="115200"/>
-            <a:ext cx="7930800" cy="488880"/>
+            <a:ext cx="7930440" cy="488520"/>
           </a:xfrm>
           <a:prstGeom prst="rect">
             <a:avLst/>
@@ -8706,7 +8706,7 @@
         <p:spPr>
           <a:xfrm>
             <a:off x="209520" y="669240"/>
-            <a:ext cx="8145720" cy="6013080"/>
+            <a:ext cx="8145360" cy="6012720"/>
           </a:xfrm>
           <a:prstGeom prst="rect">
             <a:avLst/>
@@ -8751,7 +8751,7 @@
                 <a:latin typeface="Calibri"/>
                 <a:ea typeface="DejaVu Sans"/>
               </a:rPr>
-              <a:t>mice_data.csv</a:t>
+              <a:t>mice_data_mod.csv</a:t>
             </a:r>
             <a:r>
               <a:rPr b="0" i="1" lang="en-US" sz="2000" spc="-1" strike="noStrike">
@@ -8788,7 +8788,7 @@
             </a:endParaRPr>
           </a:p>
           <a:p>
-            <a:pPr lvl="1" marL="743040" indent="-280440">
+            <a:pPr lvl="1" marL="743040" indent="-280080">
               <a:lnSpc>
                 <a:spcPct val="100000"/>
               </a:lnSpc>
@@ -8819,7 +8819,7 @@
             </a:endParaRPr>
           </a:p>
           <a:p>
-            <a:pPr lvl="1" marL="743040" indent="-280440">
+            <a:pPr lvl="1" marL="743040" indent="-280080">
               <a:lnSpc>
                 <a:spcPct val="100000"/>
               </a:lnSpc>
@@ -8850,7 +8850,7 @@
             </a:endParaRPr>
           </a:p>
           <a:p>
-            <a:pPr lvl="1" marL="743040" indent="-280440">
+            <a:pPr lvl="1" marL="743040" indent="-280080">
               <a:lnSpc>
                 <a:spcPct val="100000"/>
               </a:lnSpc>
@@ -8881,7 +8881,7 @@
             </a:endParaRPr>
           </a:p>
           <a:p>
-            <a:pPr lvl="1" marL="743040" indent="-280440">
+            <a:pPr lvl="1" marL="743040" indent="-280080">
               <a:lnSpc>
                 <a:spcPct val="100000"/>
               </a:lnSpc>
@@ -8912,7 +8912,7 @@
             </a:endParaRPr>
           </a:p>
           <a:p>
-            <a:pPr lvl="1" marL="743040" indent="-280440">
+            <a:pPr lvl="1" marL="743040" indent="-280080">
               <a:lnSpc>
                 <a:spcPct val="100000"/>
               </a:lnSpc>
@@ -8943,7 +8943,7 @@
             </a:endParaRPr>
           </a:p>
           <a:p>
-            <a:pPr lvl="1" marL="743040" indent="-280440">
+            <a:pPr lvl="1" marL="743040" indent="-280080">
               <a:lnSpc>
                 <a:spcPct val="100000"/>
               </a:lnSpc>
@@ -8974,7 +8974,7 @@
             </a:endParaRPr>
           </a:p>
           <a:p>
-            <a:pPr lvl="1" marL="743040" indent="-280440">
+            <a:pPr lvl="1" marL="743040" indent="-280080">
               <a:lnSpc>
                 <a:spcPct val="100000"/>
               </a:lnSpc>
@@ -9080,7 +9080,7 @@
         <p:spPr>
           <a:xfrm>
             <a:off x="0" y="115200"/>
-            <a:ext cx="7930800" cy="488880"/>
+            <a:ext cx="7930440" cy="488520"/>
           </a:xfrm>
           <a:prstGeom prst="rect">
             <a:avLst/>
@@ -9129,7 +9129,7 @@
         <p:spPr>
           <a:xfrm>
             <a:off x="209520" y="669240"/>
-            <a:ext cx="8048160" cy="6013080"/>
+            <a:ext cx="8047800" cy="6012720"/>
           </a:xfrm>
           <a:prstGeom prst="rect">
             <a:avLst/>
@@ -9148,7 +9148,7 @@
         <p:txBody>
           <a:bodyPr lIns="90000" rIns="90000" tIns="45000" bIns="45000"/>
           <a:p>
-            <a:pPr lvl="1" marL="918000" indent="-455400">
+            <a:pPr lvl="1" marL="918000" indent="-455040">
               <a:lnSpc>
                 <a:spcPct val="100000"/>
               </a:lnSpc>
@@ -9179,7 +9179,7 @@
             </a:endParaRPr>
           </a:p>
           <a:p>
-            <a:pPr lvl="1" marL="918000" indent="-455400">
+            <a:pPr lvl="1" marL="918000" indent="-455040">
               <a:lnSpc>
                 <a:spcPct val="100000"/>
               </a:lnSpc>
@@ -9210,7 +9210,7 @@
             </a:endParaRPr>
           </a:p>
           <a:p>
-            <a:pPr lvl="1" marL="918000" indent="-455400">
+            <a:pPr lvl="1" marL="918000" indent="-455040">
               <a:lnSpc>
                 <a:spcPct val="100000"/>
               </a:lnSpc>
@@ -9241,7 +9241,7 @@
             </a:endParaRPr>
           </a:p>
           <a:p>
-            <a:pPr lvl="1" marL="918000" indent="-455400">
+            <a:pPr lvl="1" marL="918000" indent="-455040">
               <a:lnSpc>
                 <a:spcPct val="100000"/>
               </a:lnSpc>

</xml_diff>